<commit_message>
Updated Developer Guide - import sequence diagram
</commit_message>
<xml_diff>
--- a/docs/diagrams/ImportSequenceDiagram.pptx
+++ b/docs/diagrams/ImportSequenceDiagram.pptx
@@ -208,7 +208,7 @@
           <a:p>
             <a:fld id="{F5CC4B3F-88C1-4FFA-B1B6-F41C21DC6924}" type="datetimeFigureOut">
               <a:rPr lang="en-US" smtClean="0"/>
-              <a:t>10/16/2018</a:t>
+              <a:t>10/30/2018</a:t>
             </a:fld>
             <a:endParaRPr lang="en-US"/>
           </a:p>
@@ -654,7 +654,7 @@
           <a:p>
             <a:fld id="{78C97017-6FC3-485B-9764-EAC9E56C1D49}" type="datetimeFigureOut">
               <a:rPr lang="en-US" smtClean="0"/>
-              <a:t>10/16/2018</a:t>
+              <a:t>10/30/2018</a:t>
             </a:fld>
             <a:endParaRPr lang="en-US"/>
           </a:p>
@@ -822,7 +822,7 @@
           <a:p>
             <a:fld id="{78C97017-6FC3-485B-9764-EAC9E56C1D49}" type="datetimeFigureOut">
               <a:rPr lang="en-US" smtClean="0"/>
-              <a:t>10/16/2018</a:t>
+              <a:t>10/30/2018</a:t>
             </a:fld>
             <a:endParaRPr lang="en-US"/>
           </a:p>
@@ -1000,7 +1000,7 @@
           <a:p>
             <a:fld id="{78C97017-6FC3-485B-9764-EAC9E56C1D49}" type="datetimeFigureOut">
               <a:rPr lang="en-US" smtClean="0"/>
-              <a:t>10/16/2018</a:t>
+              <a:t>10/30/2018</a:t>
             </a:fld>
             <a:endParaRPr lang="en-US"/>
           </a:p>
@@ -1168,7 +1168,7 @@
           <a:p>
             <a:fld id="{78C97017-6FC3-485B-9764-EAC9E56C1D49}" type="datetimeFigureOut">
               <a:rPr lang="en-US" smtClean="0"/>
-              <a:t>10/16/2018</a:t>
+              <a:t>10/30/2018</a:t>
             </a:fld>
             <a:endParaRPr lang="en-US"/>
           </a:p>
@@ -1413,7 +1413,7 @@
           <a:p>
             <a:fld id="{78C97017-6FC3-485B-9764-EAC9E56C1D49}" type="datetimeFigureOut">
               <a:rPr lang="en-US" smtClean="0"/>
-              <a:t>10/16/2018</a:t>
+              <a:t>10/30/2018</a:t>
             </a:fld>
             <a:endParaRPr lang="en-US"/>
           </a:p>
@@ -1698,7 +1698,7 @@
           <a:p>
             <a:fld id="{78C97017-6FC3-485B-9764-EAC9E56C1D49}" type="datetimeFigureOut">
               <a:rPr lang="en-US" smtClean="0"/>
-              <a:t>10/16/2018</a:t>
+              <a:t>10/30/2018</a:t>
             </a:fld>
             <a:endParaRPr lang="en-US"/>
           </a:p>
@@ -2117,7 +2117,7 @@
           <a:p>
             <a:fld id="{78C97017-6FC3-485B-9764-EAC9E56C1D49}" type="datetimeFigureOut">
               <a:rPr lang="en-US" smtClean="0"/>
-              <a:t>10/16/2018</a:t>
+              <a:t>10/30/2018</a:t>
             </a:fld>
             <a:endParaRPr lang="en-US"/>
           </a:p>
@@ -2234,7 +2234,7 @@
           <a:p>
             <a:fld id="{78C97017-6FC3-485B-9764-EAC9E56C1D49}" type="datetimeFigureOut">
               <a:rPr lang="en-US" smtClean="0"/>
-              <a:t>10/16/2018</a:t>
+              <a:t>10/30/2018</a:t>
             </a:fld>
             <a:endParaRPr lang="en-US"/>
           </a:p>
@@ -2329,7 +2329,7 @@
           <a:p>
             <a:fld id="{78C97017-6FC3-485B-9764-EAC9E56C1D49}" type="datetimeFigureOut">
               <a:rPr lang="en-US" smtClean="0"/>
-              <a:t>10/16/2018</a:t>
+              <a:t>10/30/2018</a:t>
             </a:fld>
             <a:endParaRPr lang="en-US"/>
           </a:p>
@@ -2604,7 +2604,7 @@
           <a:p>
             <a:fld id="{78C97017-6FC3-485B-9764-EAC9E56C1D49}" type="datetimeFigureOut">
               <a:rPr lang="en-US" smtClean="0"/>
-              <a:t>10/16/2018</a:t>
+              <a:t>10/30/2018</a:t>
             </a:fld>
             <a:endParaRPr lang="en-US"/>
           </a:p>
@@ -2856,7 +2856,7 @@
           <a:p>
             <a:fld id="{78C97017-6FC3-485B-9764-EAC9E56C1D49}" type="datetimeFigureOut">
               <a:rPr lang="en-US" smtClean="0"/>
-              <a:t>10/16/2018</a:t>
+              <a:t>10/30/2018</a:t>
             </a:fld>
             <a:endParaRPr lang="en-US"/>
           </a:p>
@@ -3067,7 +3067,7 @@
           <a:p>
             <a:fld id="{78C97017-6FC3-485B-9764-EAC9E56C1D49}" type="datetimeFigureOut">
               <a:rPr lang="en-US" smtClean="0"/>
-              <a:t>10/16/2018</a:t>
+              <a:t>10/30/2018</a:t>
             </a:fld>
             <a:endParaRPr lang="en-US"/>
           </a:p>
@@ -3444,14 +3444,96 @@
       </p:grpSpPr>
       <p:sp>
         <p:nvSpPr>
+          <p:cNvPr id="52" name="Rectangle 65">
+            <a:extLst>
+              <a:ext uri="{FF2B5EF4-FFF2-40B4-BE49-F238E27FC236}">
+                <a16:creationId xmlns:a16="http://schemas.microsoft.com/office/drawing/2014/main" id="{2F435328-7A1C-413F-938B-9EBF85C73FD9}"/>
+              </a:ext>
+            </a:extLst>
+          </p:cNvPr>
+          <p:cNvSpPr/>
+          <p:nvPr/>
+        </p:nvSpPr>
+        <p:spPr>
+          <a:xfrm>
+            <a:off x="7998924" y="152400"/>
+            <a:ext cx="1453807" cy="4400926"/>
+          </a:xfrm>
+          <a:prstGeom prst="roundRect">
+            <a:avLst>
+              <a:gd name="adj" fmla="val 3484"/>
+            </a:avLst>
+          </a:prstGeom>
+          <a:solidFill>
+            <a:schemeClr val="accent3">
+              <a:lumMod val="20000"/>
+              <a:lumOff val="80000"/>
+            </a:schemeClr>
+          </a:solidFill>
+          <a:ln>
+            <a:noFill/>
+          </a:ln>
+        </p:spPr>
+        <p:style>
+          <a:lnRef idx="2">
+            <a:schemeClr val="accent3"/>
+          </a:lnRef>
+          <a:fillRef idx="1">
+            <a:schemeClr val="lt1"/>
+          </a:fillRef>
+          <a:effectRef idx="0">
+            <a:schemeClr val="accent3"/>
+          </a:effectRef>
+          <a:fontRef idx="minor">
+            <a:schemeClr val="dk1"/>
+          </a:fontRef>
+        </p:style>
+        <p:txBody>
+          <a:bodyPr rtlCol="0" anchor="t"/>
+          <a:lstStyle/>
+          <a:p>
+            <a:r>
+              <a:rPr lang="en-US" sz="1200" b="1" dirty="0">
+                <a:solidFill>
+                  <a:schemeClr val="accent3">
+                    <a:lumMod val="75000"/>
+                  </a:schemeClr>
+                </a:solidFill>
+              </a:rPr>
+              <a:t>Biweekly</a:t>
+            </a:r>
+          </a:p>
+          <a:p>
+            <a:r>
+              <a:rPr lang="en-US" sz="1200" b="1" dirty="0">
+                <a:solidFill>
+                  <a:schemeClr val="accent3">
+                    <a:lumMod val="75000"/>
+                  </a:schemeClr>
+                </a:solidFill>
+              </a:rPr>
+              <a:t>(external library)</a:t>
+            </a:r>
+            <a:endParaRPr lang="en-SG" sz="1200" b="1" dirty="0">
+              <a:solidFill>
+                <a:schemeClr val="accent3">
+                  <a:lumMod val="75000"/>
+                </a:schemeClr>
+              </a:solidFill>
+            </a:endParaRPr>
+          </a:p>
+        </p:txBody>
+      </p:sp>
+      <p:sp>
+        <p:nvSpPr>
           <p:cNvPr id="56" name="Rectangle 65"/>
           <p:cNvSpPr/>
           <p:nvPr/>
         </p:nvSpPr>
         <p:spPr>
           <a:xfrm>
-            <a:off x="6459374" y="118895"/>
-            <a:ext cx="3903825" cy="4400926"/>
+            <a:off x="6399503" y="152400"/>
+            <a:ext cx="1453807" cy="4400926"/>
           </a:xfrm>
           <a:prstGeom prst="roundRect">
             <a:avLst>
@@ -3511,7 +3593,7 @@
         </p:nvSpPr>
         <p:spPr>
           <a:xfrm>
-            <a:off x="467813" y="163018"/>
+            <a:off x="407942" y="196523"/>
             <a:ext cx="5863964" cy="4343400"/>
           </a:xfrm>
           <a:prstGeom prst="roundRect">
@@ -3572,7 +3654,7 @@
         </p:nvSpPr>
         <p:spPr>
           <a:xfrm>
-            <a:off x="883145" y="543946"/>
+            <a:off x="823274" y="577451"/>
             <a:ext cx="1455629" cy="346760"/>
           </a:xfrm>
           <a:prstGeom prst="rect">
@@ -3641,7 +3723,7 @@
         </p:nvCxnSpPr>
         <p:spPr>
           <a:xfrm>
-            <a:off x="1610959" y="907617"/>
+            <a:off x="1551088" y="941122"/>
             <a:ext cx="0" cy="3481399"/>
           </a:xfrm>
           <a:prstGeom prst="line">
@@ -3678,7 +3760,7 @@
         </p:nvSpPr>
         <p:spPr>
           <a:xfrm>
-            <a:off x="1538951" y="1258311"/>
+            <a:off x="1479080" y="1291816"/>
             <a:ext cx="152400" cy="2932689"/>
           </a:xfrm>
           <a:prstGeom prst="rect">
@@ -3725,7 +3807,7 @@
         </p:nvSpPr>
         <p:spPr>
           <a:xfrm>
-            <a:off x="3437188" y="423022"/>
+            <a:off x="3377317" y="456527"/>
             <a:ext cx="1219200" cy="467684"/>
           </a:xfrm>
           <a:prstGeom prst="rect">
@@ -3797,7 +3879,7 @@
         </p:nvCxnSpPr>
         <p:spPr>
           <a:xfrm>
-            <a:off x="4050587" y="907617"/>
+            <a:off x="3990716" y="941122"/>
             <a:ext cx="0" cy="1482984"/>
           </a:xfrm>
           <a:prstGeom prst="line">
@@ -3834,7 +3916,7 @@
         </p:nvSpPr>
         <p:spPr>
           <a:xfrm>
-            <a:off x="3978580" y="1365810"/>
+            <a:off x="3918709" y="1399315"/>
             <a:ext cx="154408" cy="767790"/>
           </a:xfrm>
           <a:prstGeom prst="rect">
@@ -3889,8 +3971,8 @@
         </p:nvCxnSpPr>
         <p:spPr>
           <a:xfrm>
-            <a:off x="5602082" y="1613633"/>
-            <a:ext cx="0" cy="2644578"/>
+            <a:off x="5296608" y="1658024"/>
+            <a:ext cx="0" cy="2610716"/>
           </a:xfrm>
           <a:prstGeom prst="line">
             <a:avLst/>
@@ -3926,7 +4008,7 @@
         </p:nvSpPr>
         <p:spPr>
           <a:xfrm>
-            <a:off x="5525882" y="1613633"/>
+            <a:off x="5220408" y="1658024"/>
             <a:ext cx="152400" cy="276003"/>
           </a:xfrm>
           <a:prstGeom prst="rect">
@@ -3973,7 +4055,7 @@
         </p:nvCxnSpPr>
         <p:spPr>
           <a:xfrm>
-            <a:off x="419100" y="1261999"/>
+            <a:off x="359229" y="1295504"/>
             <a:ext cx="1119851" cy="0"/>
           </a:xfrm>
           <a:prstGeom prst="straightConnector1">
@@ -4009,7 +4091,7 @@
         </p:nvSpPr>
         <p:spPr>
           <a:xfrm>
-            <a:off x="38100" y="990600"/>
+            <a:off x="-21771" y="1024105"/>
             <a:ext cx="1424846" cy="215444"/>
           </a:xfrm>
           <a:prstGeom prst="rect">
@@ -4038,13 +4120,15 @@
       <p:cxnSp>
         <p:nvCxnSpPr>
           <p:cNvPr id="28" name="Straight Arrow Connector 27"/>
-          <p:cNvCxnSpPr/>
+          <p:cNvCxnSpPr>
+            <a:cxnSpLocks/>
+          </p:cNvCxnSpPr>
           <p:nvPr/>
         </p:nvCxnSpPr>
         <p:spPr>
           <a:xfrm flipV="1">
-            <a:off x="4135972" y="1512340"/>
-            <a:ext cx="922392" cy="1"/>
+            <a:off x="4076101" y="1545846"/>
+            <a:ext cx="654401" cy="1"/>
           </a:xfrm>
           <a:prstGeom prst="straightConnector1">
             <a:avLst/>
@@ -4079,7 +4163,7 @@
         </p:nvSpPr>
         <p:spPr>
           <a:xfrm>
-            <a:off x="3243421" y="2484071"/>
+            <a:off x="3183550" y="2517576"/>
             <a:ext cx="855809" cy="215444"/>
           </a:xfrm>
           <a:prstGeom prst="rect">
@@ -4114,13 +4198,16 @@
       <p:cxnSp>
         <p:nvCxnSpPr>
           <p:cNvPr id="34" name="Straight Arrow Connector 33"/>
-          <p:cNvCxnSpPr/>
+          <p:cNvCxnSpPr>
+            <a:cxnSpLocks/>
+            <a:endCxn id="21" idx="2"/>
+          </p:cNvCxnSpPr>
           <p:nvPr/>
         </p:nvCxnSpPr>
         <p:spPr>
           <a:xfrm>
-            <a:off x="4109108" y="1878232"/>
-            <a:ext cx="1492974" cy="0"/>
+            <a:off x="4049237" y="1911737"/>
+            <a:ext cx="1247371" cy="22290"/>
           </a:xfrm>
           <a:prstGeom prst="straightConnector1">
             <a:avLst/>
@@ -4159,7 +4246,7 @@
         </p:nvCxnSpPr>
         <p:spPr>
           <a:xfrm>
-            <a:off x="1691351" y="2133600"/>
+            <a:off x="1631480" y="2167105"/>
             <a:ext cx="2348067" cy="0"/>
           </a:xfrm>
           <a:prstGeom prst="straightConnector1">
@@ -4197,7 +4284,7 @@
         </p:nvCxnSpPr>
         <p:spPr>
           <a:xfrm>
-            <a:off x="380999" y="4191000"/>
+            <a:off x="321128" y="4224505"/>
             <a:ext cx="1196051" cy="0"/>
           </a:xfrm>
           <a:prstGeom prst="straightConnector1">
@@ -4235,7 +4322,7 @@
         </p:nvSpPr>
         <p:spPr>
           <a:xfrm>
-            <a:off x="5526488" y="2731313"/>
+            <a:off x="5221014" y="2775704"/>
             <a:ext cx="161322" cy="1307285"/>
           </a:xfrm>
           <a:prstGeom prst="rect">
@@ -4282,8 +4369,8 @@
         </p:nvSpPr>
         <p:spPr>
           <a:xfrm>
-            <a:off x="5646425" y="2748246"/>
-            <a:ext cx="1886615" cy="184666"/>
+            <a:off x="5340951" y="2792637"/>
+            <a:ext cx="1986720" cy="184666"/>
           </a:xfrm>
           <a:prstGeom prst="rect">
             <a:avLst/>
@@ -4310,24 +4397,19 @@
             <a:r>
               <a:rPr lang="en-US" sz="1200" dirty="0" err="1">
                 <a:solidFill>
-                  <a:schemeClr val="accent4">
-                    <a:lumMod val="75000"/>
-                  </a:schemeClr>
+                  <a:srgbClr val="7030A0"/>
                 </a:solidFill>
               </a:rPr>
-              <a:t>getTimeTableFromFile</a:t>
+              <a:t>readTimeTableFromFile</a:t>
             </a:r>
             <a:r>
               <a:rPr lang="en-US" sz="1200" dirty="0">
                 <a:solidFill>
-                  <a:schemeClr val="accent4">
-                    <a:lumMod val="75000"/>
-                  </a:schemeClr>
+                  <a:srgbClr val="7030A0"/>
                 </a:solidFill>
               </a:rPr>
-              <a:t>(path)</a:t>
-            </a:r>
-            <a:endParaRPr lang="en-US" sz="1200" dirty="0"/>
+              <a:t>(“path”)</a:t>
+            </a:r>
           </a:p>
         </p:txBody>
       </p:sp>
@@ -4339,7 +4421,7 @@
         </p:nvSpPr>
         <p:spPr>
           <a:xfrm>
-            <a:off x="1885189" y="1106150"/>
+            <a:off x="1825318" y="1139655"/>
             <a:ext cx="1899551" cy="215444"/>
           </a:xfrm>
           <a:prstGeom prst="rect">
@@ -4383,7 +4465,7 @@
         </p:nvSpPr>
         <p:spPr>
           <a:xfrm>
-            <a:off x="3272755" y="3791076"/>
+            <a:off x="3212884" y="3824581"/>
             <a:ext cx="621216" cy="215444"/>
           </a:xfrm>
           <a:prstGeom prst="rect">
@@ -4423,7 +4505,7 @@
         </p:nvSpPr>
         <p:spPr>
           <a:xfrm>
-            <a:off x="645270" y="3945901"/>
+            <a:off x="585399" y="3979406"/>
             <a:ext cx="762000" cy="215444"/>
           </a:xfrm>
           <a:prstGeom prst="rect">
@@ -4463,7 +4545,7 @@
         </p:nvSpPr>
         <p:spPr>
           <a:xfrm>
-            <a:off x="2724792" y="1905793"/>
+            <a:off x="2664921" y="1939298"/>
             <a:ext cx="220343" cy="215444"/>
           </a:xfrm>
           <a:prstGeom prst="rect">
@@ -4503,7 +4585,7 @@
         </p:nvSpPr>
         <p:spPr>
           <a:xfrm>
-            <a:off x="7200378" y="2336246"/>
+            <a:off x="6894904" y="2380637"/>
             <a:ext cx="841636" cy="300180"/>
           </a:xfrm>
           <a:prstGeom prst="rect">
@@ -4572,7 +4654,7 @@
         </p:nvCxnSpPr>
         <p:spPr>
           <a:xfrm flipH="1">
-            <a:off x="7637104" y="2627352"/>
+            <a:off x="7288783" y="2705652"/>
             <a:ext cx="3959" cy="1735710"/>
           </a:xfrm>
           <a:prstGeom prst="line">
@@ -4609,8 +4691,8 @@
         </p:nvSpPr>
         <p:spPr>
           <a:xfrm>
-            <a:off x="7538140" y="2932152"/>
-            <a:ext cx="168896" cy="775693"/>
+            <a:off x="7232666" y="2976543"/>
+            <a:ext cx="126211" cy="893541"/>
           </a:xfrm>
           <a:prstGeom prst="rect">
             <a:avLst/>
@@ -4658,7 +4740,7 @@
         </p:nvCxnSpPr>
         <p:spPr>
           <a:xfrm>
-            <a:off x="5685755" y="2975344"/>
+            <a:off x="5380281" y="3019735"/>
             <a:ext cx="1847285" cy="0"/>
           </a:xfrm>
           <a:prstGeom prst="straightConnector1">
@@ -4694,7 +4776,7 @@
         </p:nvSpPr>
         <p:spPr>
           <a:xfrm>
-            <a:off x="5472880" y="4258211"/>
+            <a:off x="5167406" y="4268740"/>
             <a:ext cx="258404" cy="261610"/>
           </a:xfrm>
           <a:prstGeom prst="rect">
@@ -4727,7 +4809,7 @@
         </p:nvSpPr>
         <p:spPr>
           <a:xfrm>
-            <a:off x="5035976" y="1260268"/>
+            <a:off x="4730502" y="1304659"/>
             <a:ext cx="1093635" cy="461538"/>
           </a:xfrm>
           <a:prstGeom prst="rect">
@@ -4809,7 +4891,7 @@
         </p:nvCxnSpPr>
         <p:spPr>
           <a:xfrm>
-            <a:off x="1691351" y="2731314"/>
+            <a:off x="1631480" y="2764819"/>
             <a:ext cx="3832164" cy="1"/>
           </a:xfrm>
           <a:prstGeom prst="straightConnector1">
@@ -4853,7 +4935,7 @@
         </p:nvCxnSpPr>
         <p:spPr>
           <a:xfrm>
-            <a:off x="1708245" y="1363918"/>
+            <a:off x="1648374" y="1397423"/>
             <a:ext cx="2256705" cy="1"/>
           </a:xfrm>
           <a:prstGeom prst="straightConnector1">
@@ -4897,7 +4979,7 @@
         </p:nvCxnSpPr>
         <p:spPr>
           <a:xfrm>
-            <a:off x="1691998" y="4036462"/>
+            <a:off x="1632127" y="4069967"/>
             <a:ext cx="3831517" cy="0"/>
           </a:xfrm>
           <a:prstGeom prst="straightConnector1">
@@ -4938,13 +5020,12 @@
           </p:cNvPr>
           <p:cNvCxnSpPr>
             <a:cxnSpLocks/>
-            <a:endCxn id="49" idx="2"/>
           </p:cNvCxnSpPr>
           <p:nvPr/>
         </p:nvCxnSpPr>
         <p:spPr>
           <a:xfrm>
-            <a:off x="5731284" y="3707845"/>
+            <a:off x="5425810" y="3884215"/>
             <a:ext cx="1891304" cy="0"/>
           </a:xfrm>
           <a:prstGeom prst="straightConnector1">
@@ -4988,8 +5069,8 @@
         </p:nvSpPr>
         <p:spPr>
           <a:xfrm>
-            <a:off x="6124536" y="3459885"/>
-            <a:ext cx="1299734" cy="184666"/>
+            <a:off x="5601126" y="3614924"/>
+            <a:ext cx="1461481" cy="184666"/>
           </a:xfrm>
           <a:prstGeom prst="rect">
             <a:avLst/>
@@ -5014,6 +5095,16 @@
           </a:lstStyle>
           <a:p>
             <a:r>
+              <a:rPr lang="en-US" sz="1200" dirty="0">
+                <a:solidFill>
+                  <a:schemeClr val="accent4">
+                    <a:lumMod val="75000"/>
+                  </a:schemeClr>
+                </a:solidFill>
+              </a:rPr>
+              <a:t>Optional&lt;</a:t>
+            </a:r>
+            <a:r>
               <a:rPr lang="en-US" sz="1200" dirty="0" err="1">
                 <a:solidFill>
                   <a:schemeClr val="accent4">
@@ -5021,7 +5112,17 @@
                   </a:schemeClr>
                 </a:solidFill>
               </a:rPr>
-              <a:t>OptionalTimeTable</a:t>
+              <a:t>TimeTable</a:t>
+            </a:r>
+            <a:r>
+              <a:rPr lang="en-US" sz="1200" dirty="0">
+                <a:solidFill>
+                  <a:schemeClr val="accent4">
+                    <a:lumMod val="75000"/>
+                  </a:schemeClr>
+                </a:solidFill>
+              </a:rPr>
+              <a:t>&gt;</a:t>
             </a:r>
             <a:endParaRPr lang="en-US" sz="1200" dirty="0"/>
           </a:p>
@@ -5041,34 +5142,28 @@
         </p:nvSpPr>
         <p:spPr>
           <a:xfrm>
-            <a:off x="8411286" y="2342948"/>
-            <a:ext cx="841636" cy="300180"/>
+            <a:off x="8097489" y="2387339"/>
+            <a:ext cx="986640" cy="300180"/>
           </a:xfrm>
           <a:prstGeom prst="rect">
             <a:avLst/>
           </a:prstGeom>
-          <a:solidFill>
-            <a:srgbClr val="7030A0"/>
-          </a:solidFill>
-          <a:ln w="19050">
-            <a:solidFill>
-              <a:srgbClr val="7030A0"/>
-            </a:solidFill>
-          </a:ln>
-          <a:effectLst/>
+          <a:ln/>
         </p:spPr>
         <p:style>
-          <a:lnRef idx="1">
-            <a:schemeClr val="accent2"/>
+          <a:lnRef idx="2">
+            <a:schemeClr val="accent3">
+              <a:shade val="50000"/>
+            </a:schemeClr>
           </a:lnRef>
-          <a:fillRef idx="2">
-            <a:schemeClr val="accent2"/>
+          <a:fillRef idx="1">
+            <a:schemeClr val="accent3"/>
           </a:fillRef>
-          <a:effectRef idx="1">
-            <a:schemeClr val="accent2"/>
+          <a:effectRef idx="0">
+            <a:schemeClr val="accent3"/>
           </a:effectRef>
           <a:fontRef idx="minor">
-            <a:schemeClr val="dk1"/>
+            <a:schemeClr val="lt1"/>
           </a:fontRef>
         </p:style>
         <p:txBody>
@@ -5082,15 +5177,7 @@
                   <a:schemeClr val="bg1"/>
                 </a:solidFill>
               </a:rPr>
-              <a:t>:</a:t>
-            </a:r>
-            <a:r>
-              <a:rPr lang="en-US" sz="1600" dirty="0" err="1">
-                <a:solidFill>
-                  <a:schemeClr val="bg1"/>
-                </a:solidFill>
-              </a:rPr>
-              <a:t>FileUtil</a:t>
+              <a:t>:Biweekly</a:t>
             </a:r>
             <a:endParaRPr lang="en-SG" sz="1600" dirty="0">
               <a:solidFill>
@@ -5114,34 +5201,28 @@
         </p:nvSpPr>
         <p:spPr>
           <a:xfrm>
-            <a:off x="8789834" y="3053546"/>
-            <a:ext cx="168896" cy="508204"/>
+            <a:off x="8564584" y="3097937"/>
+            <a:ext cx="121889" cy="331063"/>
           </a:xfrm>
           <a:prstGeom prst="rect">
             <a:avLst/>
           </a:prstGeom>
-          <a:solidFill>
-            <a:srgbClr val="7030A0"/>
-          </a:solidFill>
-          <a:ln>
-            <a:solidFill>
-              <a:srgbClr val="7030A0"/>
-            </a:solidFill>
-          </a:ln>
-          <a:effectLst/>
+          <a:ln/>
         </p:spPr>
         <p:style>
-          <a:lnRef idx="1">
-            <a:schemeClr val="accent3"/>
+          <a:lnRef idx="2">
+            <a:schemeClr val="accent3">
+              <a:shade val="50000"/>
+            </a:schemeClr>
           </a:lnRef>
-          <a:fillRef idx="2">
+          <a:fillRef idx="1">
             <a:schemeClr val="accent3"/>
           </a:fillRef>
-          <a:effectRef idx="1">
+          <a:effectRef idx="0">
             <a:schemeClr val="accent3"/>
           </a:effectRef>
           <a:fontRef idx="minor">
-            <a:schemeClr val="dk1"/>
+            <a:schemeClr val="lt1"/>
           </a:fontRef>
         </p:style>
         <p:txBody>
@@ -5169,30 +5250,26 @@
         </p:nvCxnSpPr>
         <p:spPr>
           <a:xfrm>
-            <a:off x="7707036" y="3561750"/>
+            <a:off x="7384045" y="3433699"/>
             <a:ext cx="1207348" cy="0"/>
           </a:xfrm>
           <a:prstGeom prst="straightConnector1">
             <a:avLst/>
           </a:prstGeom>
-          <a:ln w="19050">
-            <a:solidFill>
-              <a:srgbClr val="7030A0"/>
-            </a:solidFill>
-            <a:prstDash val="sysDash"/>
+          <a:ln>
             <a:headEnd type="arrow" w="med" len="med"/>
             <a:tailEnd type="none" w="med" len="med"/>
           </a:ln>
         </p:spPr>
         <p:style>
           <a:lnRef idx="1">
-            <a:schemeClr val="accent1"/>
+            <a:schemeClr val="accent3"/>
           </a:lnRef>
           <a:fillRef idx="0">
-            <a:schemeClr val="accent1"/>
+            <a:schemeClr val="accent3"/>
           </a:fillRef>
           <a:effectRef idx="0">
-            <a:schemeClr val="accent1"/>
+            <a:schemeClr val="accent3"/>
           </a:effectRef>
           <a:fontRef idx="minor">
             <a:schemeClr val="tx1"/>
@@ -5215,7 +5292,7 @@
         </p:nvCxnSpPr>
         <p:spPr>
           <a:xfrm>
-            <a:off x="7707036" y="3053546"/>
+            <a:off x="7401562" y="3097937"/>
             <a:ext cx="1082798" cy="0"/>
           </a:xfrm>
           <a:prstGeom prst="straightConnector1">
@@ -5240,12 +5317,289 @@
           </a:fontRef>
         </p:style>
       </p:cxnSp>
+      <p:sp>
+        <p:nvSpPr>
+          <p:cNvPr id="58" name="TextBox 57">
+            <a:extLst>
+              <a:ext uri="{FF2B5EF4-FFF2-40B4-BE49-F238E27FC236}">
+                <a16:creationId xmlns:a16="http://schemas.microsoft.com/office/drawing/2014/main" id="{F366A85C-F670-4A59-B0D6-CDD556EA2E0F}"/>
+              </a:ext>
+            </a:extLst>
+          </p:cNvPr>
+          <p:cNvSpPr txBox="1"/>
+          <p:nvPr/>
+        </p:nvSpPr>
+        <p:spPr>
+          <a:xfrm>
+            <a:off x="7333839" y="2821318"/>
+            <a:ext cx="1268419" cy="184666"/>
+          </a:xfrm>
+          <a:prstGeom prst="rect">
+            <a:avLst/>
+          </a:prstGeom>
+          <a:noFill/>
+        </p:spPr>
+        <p:txBody>
+          <a:bodyPr wrap="square" lIns="0" tIns="0" rIns="0" bIns="0" rtlCol="0">
+            <a:spAutoFit/>
+          </a:bodyPr>
+          <a:lstStyle>
+            <a:defPPr>
+              <a:defRPr lang="en-US"/>
+            </a:defPPr>
+            <a:lvl1pPr algn="r">
+              <a:defRPr sz="1400">
+                <a:solidFill>
+                  <a:srgbClr val="0070C0"/>
+                </a:solidFill>
+              </a:defRPr>
+            </a:lvl1pPr>
+          </a:lstStyle>
+          <a:p>
+            <a:r>
+              <a:rPr lang="en-US" sz="1200" dirty="0">
+                <a:solidFill>
+                  <a:srgbClr val="92D050"/>
+                </a:solidFill>
+              </a:rPr>
+              <a:t>Parse(“path”).first()</a:t>
+            </a:r>
+          </a:p>
+        </p:txBody>
+      </p:sp>
+      <p:sp>
+        <p:nvSpPr>
+          <p:cNvPr id="64" name="TextBox 63">
+            <a:extLst>
+              <a:ext uri="{FF2B5EF4-FFF2-40B4-BE49-F238E27FC236}">
+                <a16:creationId xmlns:a16="http://schemas.microsoft.com/office/drawing/2014/main" id="{161E14E9-15D9-4F17-9C2E-9D30A1E1F00F}"/>
+              </a:ext>
+            </a:extLst>
+          </p:cNvPr>
+          <p:cNvSpPr txBox="1"/>
+          <p:nvPr/>
+        </p:nvSpPr>
+        <p:spPr>
+          <a:xfrm>
+            <a:off x="7709570" y="3218966"/>
+            <a:ext cx="706186" cy="183870"/>
+          </a:xfrm>
+          <a:prstGeom prst="rect">
+            <a:avLst/>
+          </a:prstGeom>
+          <a:noFill/>
+        </p:spPr>
+        <p:txBody>
+          <a:bodyPr wrap="square" lIns="0" tIns="0" rIns="0" bIns="0" rtlCol="0">
+            <a:spAutoFit/>
+          </a:bodyPr>
+          <a:lstStyle>
+            <a:defPPr>
+              <a:defRPr lang="en-US"/>
+            </a:defPPr>
+            <a:lvl1pPr algn="r">
+              <a:defRPr sz="1400">
+                <a:solidFill>
+                  <a:srgbClr val="0070C0"/>
+                </a:solidFill>
+              </a:defRPr>
+            </a:lvl1pPr>
+          </a:lstStyle>
+          <a:p>
+            <a:r>
+              <a:rPr lang="en-US" sz="1200" dirty="0">
+                <a:solidFill>
+                  <a:srgbClr val="92D050"/>
+                </a:solidFill>
+              </a:rPr>
+              <a:t>iCalendar</a:t>
+            </a:r>
+          </a:p>
+        </p:txBody>
+      </p:sp>
+      <p:grpSp>
+        <p:nvGrpSpPr>
+          <p:cNvPr id="55" name="Group 54">
+            <a:extLst>
+              <a:ext uri="{FF2B5EF4-FFF2-40B4-BE49-F238E27FC236}">
+                <a16:creationId xmlns:a16="http://schemas.microsoft.com/office/drawing/2014/main" id="{E3B1FD48-6933-4D6F-BB9E-8C06525FD9A4}"/>
+              </a:ext>
+            </a:extLst>
+          </p:cNvPr>
+          <p:cNvGrpSpPr/>
+          <p:nvPr/>
+        </p:nvGrpSpPr>
+        <p:grpSpPr>
+          <a:xfrm flipH="1">
+            <a:off x="7338309" y="3565395"/>
+            <a:ext cx="217349" cy="270072"/>
+            <a:chOff x="1028134" y="5612032"/>
+            <a:chExt cx="217349" cy="270072"/>
+          </a:xfrm>
+          <a:noFill/>
+        </p:grpSpPr>
+        <p:sp>
+          <p:nvSpPr>
+            <p:cNvPr id="59" name="Freeform 58">
+              <a:extLst>
+                <a:ext uri="{FF2B5EF4-FFF2-40B4-BE49-F238E27FC236}">
+                  <a16:creationId xmlns:a16="http://schemas.microsoft.com/office/drawing/2014/main" id="{B2DEACA9-D19B-4B86-977B-E187110D8C96}"/>
+                </a:ext>
+              </a:extLst>
+            </p:cNvPr>
+            <p:cNvSpPr/>
+            <p:nvPr/>
+          </p:nvSpPr>
+          <p:spPr>
+            <a:xfrm rot="2600998" flipH="1" flipV="1">
+              <a:off x="1028134" y="5612032"/>
+              <a:ext cx="167452" cy="116880"/>
+            </a:xfrm>
+            <a:custGeom>
+              <a:avLst/>
+              <a:gdLst>
+                <a:gd name="connsiteX0" fmla="*/ 0 w 226400"/>
+                <a:gd name="connsiteY0" fmla="*/ 32920 h 171466"/>
+                <a:gd name="connsiteX1" fmla="*/ 157018 w 226400"/>
+                <a:gd name="connsiteY1" fmla="*/ 5211 h 171466"/>
+                <a:gd name="connsiteX2" fmla="*/ 221673 w 226400"/>
+                <a:gd name="connsiteY2" fmla="*/ 125284 h 171466"/>
+                <a:gd name="connsiteX3" fmla="*/ 36945 w 226400"/>
+                <a:gd name="connsiteY3" fmla="*/ 171466 h 171466"/>
+              </a:gdLst>
+              <a:ahLst/>
+              <a:cxnLst>
+                <a:cxn ang="0">
+                  <a:pos x="connsiteX0" y="connsiteY0"/>
+                </a:cxn>
+                <a:cxn ang="0">
+                  <a:pos x="connsiteX1" y="connsiteY1"/>
+                </a:cxn>
+                <a:cxn ang="0">
+                  <a:pos x="connsiteX2" y="connsiteY2"/>
+                </a:cxn>
+                <a:cxn ang="0">
+                  <a:pos x="connsiteX3" y="connsiteY3"/>
+                </a:cxn>
+              </a:cxnLst>
+              <a:rect l="l" t="t" r="r" b="b"/>
+              <a:pathLst>
+                <a:path w="226400" h="171466">
+                  <a:moveTo>
+                    <a:pt x="0" y="32920"/>
+                  </a:moveTo>
+                  <a:cubicBezTo>
+                    <a:pt x="60036" y="11368"/>
+                    <a:pt x="120073" y="-10183"/>
+                    <a:pt x="157018" y="5211"/>
+                  </a:cubicBezTo>
+                  <a:cubicBezTo>
+                    <a:pt x="193963" y="20605"/>
+                    <a:pt x="241685" y="97575"/>
+                    <a:pt x="221673" y="125284"/>
+                  </a:cubicBezTo>
+                  <a:cubicBezTo>
+                    <a:pt x="201661" y="152993"/>
+                    <a:pt x="119303" y="162229"/>
+                    <a:pt x="36945" y="171466"/>
+                  </a:cubicBezTo>
+                </a:path>
+              </a:pathLst>
+            </a:custGeom>
+            <a:grpFill/>
+            <a:ln w="19050">
+              <a:solidFill>
+                <a:srgbClr val="7030A0"/>
+              </a:solidFill>
+              <a:headEnd type="arrow" w="med" len="med"/>
+              <a:tailEnd type="none" w="med" len="med"/>
+            </a:ln>
+          </p:spPr>
+          <p:style>
+            <a:lnRef idx="1">
+              <a:schemeClr val="accent1"/>
+            </a:lnRef>
+            <a:fillRef idx="0">
+              <a:schemeClr val="accent1"/>
+            </a:fillRef>
+            <a:effectRef idx="0">
+              <a:schemeClr val="accent1"/>
+            </a:effectRef>
+            <a:fontRef idx="minor">
+              <a:schemeClr val="tx1"/>
+            </a:fontRef>
+          </p:style>
+          <p:txBody>
+            <a:bodyPr rtlCol="0" anchor="ctr"/>
+            <a:lstStyle/>
+            <a:p>
+              <a:pPr algn="ctr"/>
+              <a:endParaRPr lang="en-SG"/>
+            </a:p>
+          </p:txBody>
+        </p:sp>
+        <p:sp>
+          <p:nvSpPr>
+            <p:cNvPr id="60" name="Rectangle 59">
+              <a:extLst>
+                <a:ext uri="{FF2B5EF4-FFF2-40B4-BE49-F238E27FC236}">
+                  <a16:creationId xmlns:a16="http://schemas.microsoft.com/office/drawing/2014/main" id="{3D03DE10-D30E-4D35-9DBE-D0E949843D21}"/>
+                </a:ext>
+              </a:extLst>
+            </p:cNvPr>
+            <p:cNvSpPr/>
+            <p:nvPr/>
+          </p:nvSpPr>
+          <p:spPr>
+            <a:xfrm>
+              <a:off x="1147403" y="5712513"/>
+              <a:ext cx="98080" cy="169591"/>
+            </a:xfrm>
+            <a:prstGeom prst="rect">
+              <a:avLst/>
+            </a:prstGeom>
+            <a:grpFill/>
+            <a:ln>
+              <a:solidFill>
+                <a:srgbClr val="7030A0"/>
+              </a:solidFill>
+            </a:ln>
+            <a:effectLst/>
+          </p:spPr>
+          <p:style>
+            <a:lnRef idx="1">
+              <a:schemeClr val="accent3"/>
+            </a:lnRef>
+            <a:fillRef idx="2">
+              <a:schemeClr val="accent3"/>
+            </a:fillRef>
+            <a:effectRef idx="1">
+              <a:schemeClr val="accent3"/>
+            </a:effectRef>
+            <a:fontRef idx="minor">
+              <a:schemeClr val="dk1"/>
+            </a:fontRef>
+          </p:style>
+          <p:txBody>
+            <a:bodyPr rtlCol="0" anchor="ctr"/>
+            <a:lstStyle/>
+            <a:p>
+              <a:pPr algn="ctr"/>
+              <a:endParaRPr lang="en-SG" sz="1400">
+                <a:solidFill>
+                  <a:schemeClr val="dk1"/>
+                </a:solidFill>
+              </a:endParaRPr>
+            </a:p>
+          </p:txBody>
+        </p:sp>
+      </p:grpSp>
       <p:cxnSp>
         <p:nvCxnSpPr>
-          <p:cNvPr id="57" name="Straight Connector 56">
+          <p:cNvPr id="61" name="Straight Connector 60">
             <a:extLst>
               <a:ext uri="{FF2B5EF4-FFF2-40B4-BE49-F238E27FC236}">
-                <a16:creationId xmlns:a16="http://schemas.microsoft.com/office/drawing/2014/main" id="{22615F7E-BFA9-4BBF-8114-9DF585C08D8A}"/>
+                <a16:creationId xmlns:a16="http://schemas.microsoft.com/office/drawing/2014/main" id="{665F269D-4FCA-41D3-9372-202CCFC9DA83}"/>
               </a:ext>
             </a:extLst>
           </p:cNvPr>
@@ -5256,7 +5610,7 @@
         </p:nvCxnSpPr>
         <p:spPr>
           <a:xfrm flipH="1">
-            <a:off x="8870058" y="2693895"/>
+            <a:off x="8616561" y="2733868"/>
             <a:ext cx="3959" cy="1735710"/>
           </a:xfrm>
           <a:prstGeom prst="line">
@@ -5264,7 +5618,7 @@
           </a:prstGeom>
           <a:ln w="19050">
             <a:solidFill>
-              <a:srgbClr val="7030A0"/>
+              <a:srgbClr val="92D050"/>
             </a:solidFill>
             <a:prstDash val="sysDash"/>
           </a:ln>
@@ -5287,10 +5641,10 @@
       </p:cxnSp>
       <p:sp>
         <p:nvSpPr>
-          <p:cNvPr id="58" name="TextBox 57">
+          <p:cNvPr id="62" name="TextBox 61">
             <a:extLst>
               <a:ext uri="{FF2B5EF4-FFF2-40B4-BE49-F238E27FC236}">
-                <a16:creationId xmlns:a16="http://schemas.microsoft.com/office/drawing/2014/main" id="{F366A85C-F670-4A59-B0D6-CDD556EA2E0F}"/>
+                <a16:creationId xmlns:a16="http://schemas.microsoft.com/office/drawing/2014/main" id="{C6FD2FB6-5135-4CC6-9ED0-96831A3E7ED0}"/>
               </a:ext>
             </a:extLst>
           </p:cNvPr>
@@ -5299,8 +5653,8 @@
         </p:nvSpPr>
         <p:spPr>
           <a:xfrm>
-            <a:off x="7601639" y="2753710"/>
-            <a:ext cx="1268419" cy="184666"/>
+            <a:off x="7622649" y="3516070"/>
+            <a:ext cx="844340" cy="738664"/>
           </a:xfrm>
           <a:prstGeom prst="rect">
             <a:avLst/>
@@ -5324,6 +5678,43 @@
             </a:lvl1pPr>
           </a:lstStyle>
           <a:p>
+            <a:pPr algn="l"/>
+            <a:r>
+              <a:rPr lang="en-US" sz="1200" dirty="0">
+                <a:solidFill>
+                  <a:schemeClr val="accent4">
+                    <a:lumMod val="75000"/>
+                  </a:schemeClr>
+                </a:solidFill>
+              </a:rPr>
+              <a:t>Convert </a:t>
+            </a:r>
+          </a:p>
+          <a:p>
+            <a:pPr algn="l"/>
+            <a:r>
+              <a:rPr lang="en-US" sz="1200" dirty="0">
+                <a:solidFill>
+                  <a:schemeClr val="accent4">
+                    <a:lumMod val="75000"/>
+                  </a:schemeClr>
+                </a:solidFill>
+              </a:rPr>
+              <a:t>iCalendar to</a:t>
+            </a:r>
+          </a:p>
+          <a:p>
+            <a:pPr algn="l"/>
+            <a:r>
+              <a:rPr lang="en-US" sz="1200" dirty="0">
+                <a:solidFill>
+                  <a:schemeClr val="accent4">
+                    <a:lumMod val="75000"/>
+                  </a:schemeClr>
+                </a:solidFill>
+              </a:rPr>
+              <a:t>Optional &lt;</a:t>
+            </a:r>
             <a:r>
               <a:rPr lang="en-US" sz="1200" dirty="0" err="1">
                 <a:solidFill>
@@ -5332,7 +5723,7 @@
                   </a:schemeClr>
                 </a:solidFill>
               </a:rPr>
-              <a:t>readFromFile</a:t>
+              <a:t>TimeTable</a:t>
             </a:r>
             <a:r>
               <a:rPr lang="en-US" sz="1200" dirty="0">
@@ -5342,64 +5733,9 @@
                   </a:schemeClr>
                 </a:solidFill>
               </a:rPr>
-              <a:t>(path)</a:t>
+              <a:t>&gt;</a:t>
             </a:r>
             <a:endParaRPr lang="en-US" sz="1200" dirty="0"/>
-          </a:p>
-        </p:txBody>
-      </p:sp>
-      <p:sp>
-        <p:nvSpPr>
-          <p:cNvPr id="64" name="TextBox 63">
-            <a:extLst>
-              <a:ext uri="{FF2B5EF4-FFF2-40B4-BE49-F238E27FC236}">
-                <a16:creationId xmlns:a16="http://schemas.microsoft.com/office/drawing/2014/main" id="{161E14E9-15D9-4F17-9C2E-9D30A1E1F00F}"/>
-              </a:ext>
-            </a:extLst>
-          </p:cNvPr>
-          <p:cNvSpPr txBox="1"/>
-          <p:nvPr/>
-        </p:nvSpPr>
-        <p:spPr>
-          <a:xfrm>
-            <a:off x="8032561" y="3347017"/>
-            <a:ext cx="706186" cy="183870"/>
-          </a:xfrm>
-          <a:prstGeom prst="rect">
-            <a:avLst/>
-          </a:prstGeom>
-          <a:noFill/>
-        </p:spPr>
-        <p:txBody>
-          <a:bodyPr wrap="square" lIns="0" tIns="0" rIns="0" bIns="0" rtlCol="0">
-            <a:spAutoFit/>
-          </a:bodyPr>
-          <a:lstStyle>
-            <a:defPPr>
-              <a:defRPr lang="en-US"/>
-            </a:defPPr>
-            <a:lvl1pPr algn="r">
-              <a:defRPr sz="1400">
-                <a:solidFill>
-                  <a:srgbClr val="0070C0"/>
-                </a:solidFill>
-              </a:defRPr>
-            </a:lvl1pPr>
-          </a:lstStyle>
-          <a:p>
-            <a:r>
-              <a:rPr lang="en-US" sz="1200" dirty="0" err="1">
-                <a:solidFill>
-                  <a:srgbClr val="7030A0"/>
-                </a:solidFill>
-              </a:rPr>
-              <a:t>readString</a:t>
-            </a:r>
-            <a:endParaRPr lang="en-US" sz="1200" dirty="0">
-              <a:solidFill>
-                <a:srgbClr val="7030A0"/>
-              </a:solidFill>
-            </a:endParaRPr>
           </a:p>
         </p:txBody>
       </p:sp>

</xml_diff>